<commit_message>
Dokumentáció készítése, screenek külön fájlba szedése, sablonképek törlése
</commit_message>
<xml_diff>
--- a/project dokumentumok/Projekt bemutató.pptx
+++ b/project dokumentumok/Projekt bemutató.pptx
@@ -19,8 +19,9 @@
     <p:sldId id="267" r:id="rId13"/>
     <p:sldId id="268" r:id="rId14"/>
     <p:sldId id="269" r:id="rId15"/>
-    <p:sldId id="270" r:id="rId16"/>
-    <p:sldId id="271" r:id="rId17"/>
+    <p:sldId id="272" r:id="rId16"/>
+    <p:sldId id="270" r:id="rId17"/>
+    <p:sldId id="271" r:id="rId18"/>
   </p:sldIdLst>
   <p:sldSz cx="12192000" cy="6858000"/>
   <p:notesSz cx="6858000" cy="9144000"/>
@@ -2380,7 +2381,7 @@
 <dgm:dataModel xmlns:dgm="http://schemas.openxmlformats.org/drawingml/2006/diagram" xmlns:a="http://schemas.openxmlformats.org/drawingml/2006/main">
   <dgm:ptLst>
     <dgm:pt modelId="{DBC53F83-76AC-4F57-9EB0-8080AF8854FB}" type="doc">
-      <dgm:prSet loTypeId="urn:microsoft.com/office/officeart/2005/8/layout/vList2" loCatId="list" qsTypeId="urn:microsoft.com/office/officeart/2005/8/quickstyle/simple4" qsCatId="simple" csTypeId="urn:microsoft.com/office/officeart/2005/8/colors/accent0_3" csCatId="mainScheme"/>
+      <dgm:prSet loTypeId="urn:microsoft.com/office/officeart/2005/8/layout/vList2" loCatId="list" qsTypeId="urn:microsoft.com/office/officeart/2005/8/quickstyle/simple4" qsCatId="simple" csTypeId="urn:microsoft.com/office/officeart/2005/8/colors/accent0_3" csCatId="mainScheme" phldr="1"/>
       <dgm:spPr/>
       <dgm:t>
         <a:bodyPr/>
@@ -2583,10 +2584,70 @@
         <a:lstStyle/>
         <a:p>
           <a:r>
-            <a:rPr lang="hu-HU"/>
-            <a:t>The user can cancel his order by contacting support</a:t>
+            <a:rPr lang="hu-HU" dirty="0"/>
+            <a:t>The </a:t>
           </a:r>
-          <a:endParaRPr lang="en-US"/>
+          <a:r>
+            <a:rPr lang="hu-HU" dirty="0" err="1"/>
+            <a:t>user</a:t>
+          </a:r>
+          <a:r>
+            <a:rPr lang="hu-HU" dirty="0"/>
+            <a:t> </a:t>
+          </a:r>
+          <a:r>
+            <a:rPr lang="hu-HU" dirty="0" err="1"/>
+            <a:t>can</a:t>
+          </a:r>
+          <a:r>
+            <a:rPr lang="hu-HU" dirty="0"/>
+            <a:t> </a:t>
+          </a:r>
+          <a:r>
+            <a:rPr lang="hu-HU" dirty="0" err="1"/>
+            <a:t>cancel</a:t>
+          </a:r>
+          <a:r>
+            <a:rPr lang="hu-HU" dirty="0"/>
+            <a:t> </a:t>
+          </a:r>
+          <a:r>
+            <a:rPr lang="hu-HU" dirty="0" err="1"/>
+            <a:t>his</a:t>
+          </a:r>
+          <a:r>
+            <a:rPr lang="hu-HU" dirty="0"/>
+            <a:t> </a:t>
+          </a:r>
+          <a:r>
+            <a:rPr lang="hu-HU" dirty="0" err="1"/>
+            <a:t>order</a:t>
+          </a:r>
+          <a:r>
+            <a:rPr lang="hu-HU" dirty="0"/>
+            <a:t> </a:t>
+          </a:r>
+          <a:r>
+            <a:rPr lang="hu-HU" dirty="0" err="1"/>
+            <a:t>by</a:t>
+          </a:r>
+          <a:r>
+            <a:rPr lang="hu-HU" dirty="0"/>
+            <a:t> </a:t>
+          </a:r>
+          <a:r>
+            <a:rPr lang="hu-HU" dirty="0" err="1"/>
+            <a:t>contacting</a:t>
+          </a:r>
+          <a:r>
+            <a:rPr lang="hu-HU" dirty="0"/>
+            <a:t> </a:t>
+          </a:r>
+          <a:r>
+            <a:rPr lang="hu-HU" dirty="0" err="1"/>
+            <a:t>support</a:t>
+          </a:r>
+          <a:endParaRPr lang="hu-HU" dirty="0"/>
         </a:p>
       </dgm:t>
     </dgm:pt>
@@ -3092,7 +3153,7 @@
 <dgm:dataModel xmlns:dgm="http://schemas.openxmlformats.org/drawingml/2006/diagram" xmlns:a="http://schemas.openxmlformats.org/drawingml/2006/main">
   <dgm:ptLst>
     <dgm:pt modelId="{11E3AA38-F3E1-4DCE-B37A-873F37535F15}" type="doc">
-      <dgm:prSet loTypeId="urn:microsoft.com/office/officeart/2005/8/layout/vList2" loCatId="list" qsTypeId="urn:microsoft.com/office/officeart/2005/8/quickstyle/simple1" qsCatId="simple" csTypeId="urn:microsoft.com/office/officeart/2005/8/colors/accent0_3" csCatId="mainScheme"/>
+      <dgm:prSet loTypeId="urn:microsoft.com/office/officeart/2005/8/layout/vList2" loCatId="list" qsTypeId="urn:microsoft.com/office/officeart/2005/8/quickstyle/simple1" qsCatId="simple" csTypeId="urn:microsoft.com/office/officeart/2005/8/colors/accent0_3" csCatId="mainScheme" phldr="1"/>
       <dgm:spPr/>
       <dgm:t>
         <a:bodyPr/>
@@ -3110,10 +3171,10 @@
         <a:lstStyle/>
         <a:p>
           <a:r>
-            <a:rPr lang="hu-HU"/>
+            <a:rPr lang="hu-HU" dirty="0" err="1"/>
             <a:t>MySQL</a:t>
           </a:r>
-          <a:endParaRPr lang="en-US"/>
+          <a:endParaRPr lang="en-US" dirty="0"/>
         </a:p>
       </dgm:t>
     </dgm:pt>
@@ -3245,10 +3306,14 @@
         <a:lstStyle/>
         <a:p>
           <a:r>
-            <a:rPr lang="hu-HU"/>
-            <a:t>5 tables</a:t>
+            <a:rPr lang="hu-HU" dirty="0"/>
+            <a:t>5 </a:t>
           </a:r>
-          <a:endParaRPr lang="en-US"/>
+          <a:r>
+            <a:rPr lang="hu-HU" dirty="0" err="1"/>
+            <a:t>tables</a:t>
+          </a:r>
+          <a:endParaRPr lang="en-US" dirty="0"/>
         </a:p>
       </dgm:t>
     </dgm:pt>
@@ -3274,6 +3339,43 @@
         </a:p>
       </dgm:t>
     </dgm:pt>
+    <dgm:pt modelId="{702506F9-2F75-413F-BF9D-DC79AB69C49D}">
+      <dgm:prSet/>
+      <dgm:spPr/>
+      <dgm:t>
+        <a:bodyPr/>
+        <a:lstStyle/>
+        <a:p>
+          <a:r>
+            <a:rPr lang="hu-HU" dirty="0" err="1"/>
+            <a:t>PHPMyAdmin</a:t>
+          </a:r>
+          <a:endParaRPr lang="en-US" dirty="0"/>
+        </a:p>
+      </dgm:t>
+    </dgm:pt>
+    <dgm:pt modelId="{700647D9-318A-4006-9B43-D879BDDEFF9F}" type="parTrans" cxnId="{50B168B2-8AAE-4417-B331-F07F9F3D4502}">
+      <dgm:prSet/>
+      <dgm:spPr/>
+      <dgm:t>
+        <a:bodyPr/>
+        <a:lstStyle/>
+        <a:p>
+          <a:endParaRPr lang="hu-HU"/>
+        </a:p>
+      </dgm:t>
+    </dgm:pt>
+    <dgm:pt modelId="{095A7668-2324-4C6A-9CAB-B42DDF28DAB9}" type="sibTrans" cxnId="{50B168B2-8AAE-4417-B331-F07F9F3D4502}">
+      <dgm:prSet/>
+      <dgm:spPr/>
+      <dgm:t>
+        <a:bodyPr/>
+        <a:lstStyle/>
+        <a:p>
+          <a:endParaRPr lang="hu-HU"/>
+        </a:p>
+      </dgm:t>
+    </dgm:pt>
     <dgm:pt modelId="{E713B0A6-4BBA-4470-8816-176521DE2620}" type="pres">
       <dgm:prSet presAssocID="{11E3AA38-F3E1-4DCE-B37A-873F37535F15}" presName="linear" presStyleCnt="0">
         <dgm:presLayoutVars>
@@ -3284,7 +3386,7 @@
       <dgm:spPr/>
     </dgm:pt>
     <dgm:pt modelId="{A4C0109D-E7AE-4A00-A1EE-34A8826F8802}" type="pres">
-      <dgm:prSet presAssocID="{33AC8B9D-9195-4AEB-93E9-70AB70B46AC5}" presName="parentText" presStyleLbl="node1" presStyleIdx="0" presStyleCnt="3">
+      <dgm:prSet presAssocID="{33AC8B9D-9195-4AEB-93E9-70AB70B46AC5}" presName="parentText" presStyleLbl="node1" presStyleIdx="0" presStyleCnt="4">
         <dgm:presLayoutVars>
           <dgm:chMax val="0"/>
           <dgm:bulletEnabled val="1"/>
@@ -3297,7 +3399,7 @@
       <dgm:spPr/>
     </dgm:pt>
     <dgm:pt modelId="{FED031CC-FBB8-44F1-8567-28EAC9734AD6}" type="pres">
-      <dgm:prSet presAssocID="{8F019C6A-C102-4267-9F21-ECFC1A0162B4}" presName="parentText" presStyleLbl="node1" presStyleIdx="1" presStyleCnt="3">
+      <dgm:prSet presAssocID="{8F019C6A-C102-4267-9F21-ECFC1A0162B4}" presName="parentText" presStyleLbl="node1" presStyleIdx="1" presStyleCnt="4">
         <dgm:presLayoutVars>
           <dgm:chMax val="0"/>
           <dgm:bulletEnabled val="1"/>
@@ -3313,8 +3415,21 @@
       </dgm:prSet>
       <dgm:spPr/>
     </dgm:pt>
+    <dgm:pt modelId="{37228A30-2FA2-4569-9C78-8E5ABBF27297}" type="pres">
+      <dgm:prSet presAssocID="{702506F9-2F75-413F-BF9D-DC79AB69C49D}" presName="parentText" presStyleLbl="node1" presStyleIdx="2" presStyleCnt="4">
+        <dgm:presLayoutVars>
+          <dgm:chMax val="0"/>
+          <dgm:bulletEnabled val="1"/>
+        </dgm:presLayoutVars>
+      </dgm:prSet>
+      <dgm:spPr/>
+    </dgm:pt>
+    <dgm:pt modelId="{AA448E85-CEED-4E3F-975B-4072EE98FA1C}" type="pres">
+      <dgm:prSet presAssocID="{095A7668-2324-4C6A-9CAB-B42DDF28DAB9}" presName="spacer" presStyleCnt="0"/>
+      <dgm:spPr/>
+    </dgm:pt>
     <dgm:pt modelId="{33C0AEA7-5D4C-4E29-88C3-D72E9B8E4250}" type="pres">
-      <dgm:prSet presAssocID="{0C0D6ECD-63FB-4A94-AE98-159146F21157}" presName="parentText" presStyleLbl="node1" presStyleIdx="2" presStyleCnt="3">
+      <dgm:prSet presAssocID="{0C0D6ECD-63FB-4A94-AE98-159146F21157}" presName="parentText" presStyleLbl="node1" presStyleIdx="3" presStyleCnt="4">
         <dgm:presLayoutVars>
           <dgm:chMax val="0"/>
           <dgm:bulletEnabled val="1"/>
@@ -3325,19 +3440,23 @@
   </dgm:ptLst>
   <dgm:cxnLst>
     <dgm:cxn modelId="{6C286D05-6E11-4598-9E85-0E071D48E88B}" srcId="{11E3AA38-F3E1-4DCE-B37A-873F37535F15}" destId="{33AC8B9D-9195-4AEB-93E9-70AB70B46AC5}" srcOrd="0" destOrd="0" parTransId="{39AF1CDC-5154-436C-962D-8C45E57503ED}" sibTransId="{AA854263-2B29-4199-8791-3C970E8CE7DF}"/>
-    <dgm:cxn modelId="{996C3D0F-FF78-4D8F-8376-D037641B3983}" srcId="{11E3AA38-F3E1-4DCE-B37A-873F37535F15}" destId="{0C0D6ECD-63FB-4A94-AE98-159146F21157}" srcOrd="2" destOrd="0" parTransId="{C2CC349C-F9A4-43C8-84EE-72E0E2CD707F}" sibTransId="{98FADBFD-7D02-4102-8635-887DD68ACBFE}"/>
+    <dgm:cxn modelId="{996C3D0F-FF78-4D8F-8376-D037641B3983}" srcId="{11E3AA38-F3E1-4DCE-B37A-873F37535F15}" destId="{0C0D6ECD-63FB-4A94-AE98-159146F21157}" srcOrd="3" destOrd="0" parTransId="{C2CC349C-F9A4-43C8-84EE-72E0E2CD707F}" sibTransId="{98FADBFD-7D02-4102-8635-887DD68ACBFE}"/>
     <dgm:cxn modelId="{5E92B91A-0F4E-444B-8B0C-C3234196983B}" type="presOf" srcId="{0C0D6ECD-63FB-4A94-AE98-159146F21157}" destId="{33C0AEA7-5D4C-4E29-88C3-D72E9B8E4250}" srcOrd="0" destOrd="0" presId="urn:microsoft.com/office/officeart/2005/8/layout/vList2"/>
     <dgm:cxn modelId="{02A4AA23-F44B-4F9F-8CDE-6C38409DB8D6}" type="presOf" srcId="{8F019C6A-C102-4267-9F21-ECFC1A0162B4}" destId="{FED031CC-FBB8-44F1-8567-28EAC9734AD6}" srcOrd="0" destOrd="0" presId="urn:microsoft.com/office/officeart/2005/8/layout/vList2"/>
     <dgm:cxn modelId="{72589434-8B55-47B9-9573-534BFA01C812}" type="presOf" srcId="{8CB0AFF9-66A9-40F4-BD63-A0A5D1C0A93A}" destId="{5FA59C70-FC21-43AD-8C22-6DE5EC5B6298}" srcOrd="0" destOrd="0" presId="urn:microsoft.com/office/officeart/2005/8/layout/vList2"/>
     <dgm:cxn modelId="{39790A44-EA27-4AC1-A2B0-5329F28483A2}" type="presOf" srcId="{33AC8B9D-9195-4AEB-93E9-70AB70B46AC5}" destId="{A4C0109D-E7AE-4A00-A1EE-34A8826F8802}" srcOrd="0" destOrd="0" presId="urn:microsoft.com/office/officeart/2005/8/layout/vList2"/>
+    <dgm:cxn modelId="{F1D8F97E-6445-4B60-8C22-A565D88A7B70}" type="presOf" srcId="{702506F9-2F75-413F-BF9D-DC79AB69C49D}" destId="{37228A30-2FA2-4569-9C78-8E5ABBF27297}" srcOrd="0" destOrd="0" presId="urn:microsoft.com/office/officeart/2005/8/layout/vList2"/>
     <dgm:cxn modelId="{9F55EE80-BC60-422F-883D-1E61B0F493E5}" srcId="{11E3AA38-F3E1-4DCE-B37A-873F37535F15}" destId="{8F019C6A-C102-4267-9F21-ECFC1A0162B4}" srcOrd="1" destOrd="0" parTransId="{9375C3BE-7FFC-4696-A1B9-5A5B02680043}" sibTransId="{DCDE6069-4B57-49CD-B9F5-B4387641DA26}"/>
     <dgm:cxn modelId="{E8C2C4A0-6BBC-4DF8-8C2A-9F74AFBE1FED}" srcId="{8F019C6A-C102-4267-9F21-ECFC1A0162B4}" destId="{8CB0AFF9-66A9-40F4-BD63-A0A5D1C0A93A}" srcOrd="0" destOrd="0" parTransId="{764115F6-A5FF-4DA1-8624-E8EA21CC6BC6}" sibTransId="{15FCE06D-13A6-4D53-9C90-A07426C3DFE4}"/>
+    <dgm:cxn modelId="{50B168B2-8AAE-4417-B331-F07F9F3D4502}" srcId="{11E3AA38-F3E1-4DCE-B37A-873F37535F15}" destId="{702506F9-2F75-413F-BF9D-DC79AB69C49D}" srcOrd="2" destOrd="0" parTransId="{700647D9-318A-4006-9B43-D879BDDEFF9F}" sibTransId="{095A7668-2324-4C6A-9CAB-B42DDF28DAB9}"/>
     <dgm:cxn modelId="{1C544CB9-F9F9-4C7C-8419-5ED2C144DE88}" type="presOf" srcId="{11E3AA38-F3E1-4DCE-B37A-873F37535F15}" destId="{E713B0A6-4BBA-4470-8816-176521DE2620}" srcOrd="0" destOrd="0" presId="urn:microsoft.com/office/officeart/2005/8/layout/vList2"/>
     <dgm:cxn modelId="{17A3DF31-B7ED-4E10-84AE-2EBE5F011849}" type="presParOf" srcId="{E713B0A6-4BBA-4470-8816-176521DE2620}" destId="{A4C0109D-E7AE-4A00-A1EE-34A8826F8802}" srcOrd="0" destOrd="0" presId="urn:microsoft.com/office/officeart/2005/8/layout/vList2"/>
     <dgm:cxn modelId="{016303B4-0FFD-4CFD-B649-62A282733DE6}" type="presParOf" srcId="{E713B0A6-4BBA-4470-8816-176521DE2620}" destId="{435D95C3-F1CA-423B-B401-8568AD17CA2F}" srcOrd="1" destOrd="0" presId="urn:microsoft.com/office/officeart/2005/8/layout/vList2"/>
     <dgm:cxn modelId="{5A50CB80-E2B2-4D04-8B7D-847D04D1252A}" type="presParOf" srcId="{E713B0A6-4BBA-4470-8816-176521DE2620}" destId="{FED031CC-FBB8-44F1-8567-28EAC9734AD6}" srcOrd="2" destOrd="0" presId="urn:microsoft.com/office/officeart/2005/8/layout/vList2"/>
     <dgm:cxn modelId="{0B3EEC87-2A36-4A2D-9E21-3EB69564BCE3}" type="presParOf" srcId="{E713B0A6-4BBA-4470-8816-176521DE2620}" destId="{5FA59C70-FC21-43AD-8C22-6DE5EC5B6298}" srcOrd="3" destOrd="0" presId="urn:microsoft.com/office/officeart/2005/8/layout/vList2"/>
-    <dgm:cxn modelId="{B4DE19E4-FDE0-4713-B7A2-066FE4F17DC1}" type="presParOf" srcId="{E713B0A6-4BBA-4470-8816-176521DE2620}" destId="{33C0AEA7-5D4C-4E29-88C3-D72E9B8E4250}" srcOrd="4" destOrd="0" presId="urn:microsoft.com/office/officeart/2005/8/layout/vList2"/>
+    <dgm:cxn modelId="{D80AE4A1-A2A0-4FE9-93B7-1C162692998B}" type="presParOf" srcId="{E713B0A6-4BBA-4470-8816-176521DE2620}" destId="{37228A30-2FA2-4569-9C78-8E5ABBF27297}" srcOrd="4" destOrd="0" presId="urn:microsoft.com/office/officeart/2005/8/layout/vList2"/>
+    <dgm:cxn modelId="{F4934FD9-E80D-4C1A-8D99-062CDF75EAF1}" type="presParOf" srcId="{E713B0A6-4BBA-4470-8816-176521DE2620}" destId="{AA448E85-CEED-4E3F-975B-4072EE98FA1C}" srcOrd="5" destOrd="0" presId="urn:microsoft.com/office/officeart/2005/8/layout/vList2"/>
+    <dgm:cxn modelId="{B4DE19E4-FDE0-4713-B7A2-066FE4F17DC1}" type="presParOf" srcId="{E713B0A6-4BBA-4470-8816-176521DE2620}" destId="{33C0AEA7-5D4C-4E29-88C3-D72E9B8E4250}" srcOrd="6" destOrd="0" presId="urn:microsoft.com/office/officeart/2005/8/layout/vList2"/>
   </dgm:cxnLst>
   <dgm:bg>
     <a:solidFill>
@@ -3954,10 +4073,70 @@
             <a:buNone/>
           </a:pPr>
           <a:r>
-            <a:rPr lang="hu-HU" sz="2100" kern="1200"/>
-            <a:t>The user can cancel his order by contacting support</a:t>
+            <a:rPr lang="hu-HU" sz="2100" kern="1200" dirty="0"/>
+            <a:t>The </a:t>
           </a:r>
-          <a:endParaRPr lang="en-US" sz="2100" kern="1200"/>
+          <a:r>
+            <a:rPr lang="hu-HU" sz="2100" kern="1200" dirty="0" err="1"/>
+            <a:t>user</a:t>
+          </a:r>
+          <a:r>
+            <a:rPr lang="hu-HU" sz="2100" kern="1200" dirty="0"/>
+            <a:t> </a:t>
+          </a:r>
+          <a:r>
+            <a:rPr lang="hu-HU" sz="2100" kern="1200" dirty="0" err="1"/>
+            <a:t>can</a:t>
+          </a:r>
+          <a:r>
+            <a:rPr lang="hu-HU" sz="2100" kern="1200" dirty="0"/>
+            <a:t> </a:t>
+          </a:r>
+          <a:r>
+            <a:rPr lang="hu-HU" sz="2100" kern="1200" dirty="0" err="1"/>
+            <a:t>cancel</a:t>
+          </a:r>
+          <a:r>
+            <a:rPr lang="hu-HU" sz="2100" kern="1200" dirty="0"/>
+            <a:t> </a:t>
+          </a:r>
+          <a:r>
+            <a:rPr lang="hu-HU" sz="2100" kern="1200" dirty="0" err="1"/>
+            <a:t>his</a:t>
+          </a:r>
+          <a:r>
+            <a:rPr lang="hu-HU" sz="2100" kern="1200" dirty="0"/>
+            <a:t> </a:t>
+          </a:r>
+          <a:r>
+            <a:rPr lang="hu-HU" sz="2100" kern="1200" dirty="0" err="1"/>
+            <a:t>order</a:t>
+          </a:r>
+          <a:r>
+            <a:rPr lang="hu-HU" sz="2100" kern="1200" dirty="0"/>
+            <a:t> </a:t>
+          </a:r>
+          <a:r>
+            <a:rPr lang="hu-HU" sz="2100" kern="1200" dirty="0" err="1"/>
+            <a:t>by</a:t>
+          </a:r>
+          <a:r>
+            <a:rPr lang="hu-HU" sz="2100" kern="1200" dirty="0"/>
+            <a:t> </a:t>
+          </a:r>
+          <a:r>
+            <a:rPr lang="hu-HU" sz="2100" kern="1200" dirty="0" err="1"/>
+            <a:t>contacting</a:t>
+          </a:r>
+          <a:r>
+            <a:rPr lang="hu-HU" sz="2100" kern="1200" dirty="0"/>
+            <a:t> </a:t>
+          </a:r>
+          <a:r>
+            <a:rPr lang="hu-HU" sz="2100" kern="1200" dirty="0" err="1"/>
+            <a:t>support</a:t>
+          </a:r>
+          <a:endParaRPr lang="hu-HU" sz="2100" kern="1200" dirty="0"/>
         </a:p>
       </dsp:txBody>
       <dsp:txXfrm>
@@ -4464,8 +4643,8 @@
       </dsp:nvSpPr>
       <dsp:spPr>
         <a:xfrm>
-          <a:off x="0" y="23993"/>
-          <a:ext cx="9604375" cy="959400"/>
+          <a:off x="0" y="52991"/>
+          <a:ext cx="8909266" cy="585000"/>
         </a:xfrm>
         <a:prstGeom prst="roundRect">
           <a:avLst/>
@@ -4506,12 +4685,12 @@
         </a:fontRef>
       </dsp:style>
       <dsp:txBody>
-        <a:bodyPr spcFirstLastPara="0" vert="horz" wrap="square" lIns="156210" tIns="156210" rIns="156210" bIns="156210" numCol="1" spcCol="1270" anchor="ctr" anchorCtr="0">
+        <a:bodyPr spcFirstLastPara="0" vert="horz" wrap="square" lIns="95250" tIns="95250" rIns="95250" bIns="95250" numCol="1" spcCol="1270" anchor="ctr" anchorCtr="0">
           <a:noAutofit/>
         </a:bodyPr>
         <a:lstStyle/>
         <a:p>
-          <a:pPr marL="0" lvl="0" indent="0" algn="l" defTabSz="1822450">
+          <a:pPr marL="0" lvl="0" indent="0" algn="l" defTabSz="1111250">
             <a:lnSpc>
               <a:spcPct val="90000"/>
             </a:lnSpc>
@@ -4524,15 +4703,15 @@
             <a:buNone/>
           </a:pPr>
           <a:r>
-            <a:rPr lang="hu-HU" sz="4100" kern="1200"/>
+            <a:rPr lang="hu-HU" sz="2500" kern="1200" dirty="0" err="1"/>
             <a:t>MySQL</a:t>
           </a:r>
-          <a:endParaRPr lang="en-US" sz="4100" kern="1200"/>
+          <a:endParaRPr lang="en-US" sz="2500" kern="1200" dirty="0"/>
         </a:p>
       </dsp:txBody>
       <dsp:txXfrm>
-        <a:off x="46834" y="70827"/>
-        <a:ext cx="9510707" cy="865732"/>
+        <a:off x="28557" y="81548"/>
+        <a:ext cx="8852152" cy="527886"/>
       </dsp:txXfrm>
     </dsp:sp>
     <dsp:sp modelId="{FED031CC-FBB8-44F1-8567-28EAC9734AD6}">
@@ -4542,8 +4721,8 @@
       </dsp:nvSpPr>
       <dsp:spPr>
         <a:xfrm>
-          <a:off x="0" y="1101473"/>
-          <a:ext cx="9604375" cy="959400"/>
+          <a:off x="0" y="709991"/>
+          <a:ext cx="8909266" cy="585000"/>
         </a:xfrm>
         <a:prstGeom prst="roundRect">
           <a:avLst/>
@@ -4584,12 +4763,12 @@
         </a:fontRef>
       </dsp:style>
       <dsp:txBody>
-        <a:bodyPr spcFirstLastPara="0" vert="horz" wrap="square" lIns="156210" tIns="156210" rIns="156210" bIns="156210" numCol="1" spcCol="1270" anchor="ctr" anchorCtr="0">
+        <a:bodyPr spcFirstLastPara="0" vert="horz" wrap="square" lIns="95250" tIns="95250" rIns="95250" bIns="95250" numCol="1" spcCol="1270" anchor="ctr" anchorCtr="0">
           <a:noAutofit/>
         </a:bodyPr>
         <a:lstStyle/>
         <a:p>
-          <a:pPr marL="0" lvl="0" indent="0" algn="l" defTabSz="1822450">
+          <a:pPr marL="0" lvl="0" indent="0" algn="l" defTabSz="1111250">
             <a:lnSpc>
               <a:spcPct val="90000"/>
             </a:lnSpc>
@@ -4602,23 +4781,23 @@
             <a:buNone/>
           </a:pPr>
           <a:r>
-            <a:rPr lang="hu-HU" sz="4100" kern="1200" dirty="0" err="1"/>
+            <a:rPr lang="hu-HU" sz="2500" kern="1200" dirty="0" err="1"/>
             <a:t>Loading</a:t>
           </a:r>
           <a:r>
-            <a:rPr lang="hu-HU" sz="4100" kern="1200" dirty="0"/>
+            <a:rPr lang="hu-HU" sz="2500" kern="1200" dirty="0"/>
             <a:t> </a:t>
           </a:r>
           <a:r>
-            <a:rPr lang="hu-HU" sz="4100" kern="1200" dirty="0" err="1"/>
+            <a:rPr lang="hu-HU" sz="2500" kern="1200" dirty="0" err="1"/>
             <a:t>data</a:t>
           </a:r>
-          <a:endParaRPr lang="en-US" sz="4100" kern="1200" dirty="0"/>
+          <a:endParaRPr lang="en-US" sz="2500" kern="1200" dirty="0"/>
         </a:p>
       </dsp:txBody>
       <dsp:txXfrm>
-        <a:off x="46834" y="1148307"/>
-        <a:ext cx="9510707" cy="865732"/>
+        <a:off x="28557" y="738548"/>
+        <a:ext cx="8852152" cy="527886"/>
       </dsp:txXfrm>
     </dsp:sp>
     <dsp:sp modelId="{5FA59C70-FC21-43AD-8C22-6DE5EC5B6298}">
@@ -4628,8 +4807,8 @@
       </dsp:nvSpPr>
       <dsp:spPr>
         <a:xfrm>
-          <a:off x="0" y="2060873"/>
-          <a:ext cx="9604375" cy="678960"/>
+          <a:off x="0" y="1294991"/>
+          <a:ext cx="8909266" cy="414000"/>
         </a:xfrm>
         <a:prstGeom prst="rect">
           <a:avLst/>
@@ -4653,12 +4832,12 @@
         <a:fontRef idx="minor"/>
       </dsp:style>
       <dsp:txBody>
-        <a:bodyPr spcFirstLastPara="0" vert="horz" wrap="square" lIns="304939" tIns="52070" rIns="291592" bIns="52070" numCol="1" spcCol="1270" anchor="t" anchorCtr="0">
+        <a:bodyPr spcFirstLastPara="0" vert="horz" wrap="square" lIns="282869" tIns="31750" rIns="177800" bIns="31750" numCol="1" spcCol="1270" anchor="t" anchorCtr="0">
           <a:noAutofit/>
         </a:bodyPr>
         <a:lstStyle/>
         <a:p>
-          <a:pPr marL="285750" lvl="1" indent="-285750" algn="l" defTabSz="1422400">
+          <a:pPr marL="228600" lvl="1" indent="-228600" algn="l" defTabSz="889000">
             <a:lnSpc>
               <a:spcPct val="90000"/>
             </a:lnSpc>
@@ -4671,42 +4850,42 @@
             <a:buChar char="•"/>
           </a:pPr>
           <a:r>
-            <a:rPr lang="hu-HU" sz="3200" kern="1200" dirty="0" err="1"/>
+            <a:rPr lang="hu-HU" sz="2000" kern="1200" dirty="0" err="1"/>
             <a:t>For</a:t>
           </a:r>
           <a:r>
-            <a:rPr lang="hu-HU" sz="3200" kern="1200" dirty="0"/>
+            <a:rPr lang="hu-HU" sz="2000" kern="1200" dirty="0"/>
             <a:t> </a:t>
           </a:r>
           <a:r>
-            <a:rPr lang="hu-HU" sz="3200" kern="1200" dirty="0" err="1"/>
+            <a:rPr lang="hu-HU" sz="2000" kern="1200" dirty="0" err="1"/>
             <a:t>all</a:t>
           </a:r>
           <a:r>
-            <a:rPr lang="hu-HU" sz="3200" kern="1200" dirty="0"/>
+            <a:rPr lang="hu-HU" sz="2000" kern="1200" dirty="0"/>
             <a:t> </a:t>
           </a:r>
           <a:r>
-            <a:rPr lang="hu-HU" sz="3200" kern="1200" dirty="0" err="1"/>
+            <a:rPr lang="hu-HU" sz="2000" kern="1200" dirty="0" err="1"/>
             <a:t>tables</a:t>
           </a:r>
-          <a:endParaRPr lang="en-US" sz="3200" kern="1200" dirty="0"/>
+          <a:endParaRPr lang="en-US" sz="2000" kern="1200" dirty="0"/>
         </a:p>
       </dsp:txBody>
       <dsp:txXfrm>
-        <a:off x="0" y="2060873"/>
-        <a:ext cx="9604375" cy="678960"/>
+        <a:off x="0" y="1294991"/>
+        <a:ext cx="8909266" cy="414000"/>
       </dsp:txXfrm>
     </dsp:sp>
-    <dsp:sp modelId="{33C0AEA7-5D4C-4E29-88C3-D72E9B8E4250}">
+    <dsp:sp modelId="{37228A30-2FA2-4569-9C78-8E5ABBF27297}">
       <dsp:nvSpPr>
         <dsp:cNvPr id="0" name=""/>
         <dsp:cNvSpPr/>
       </dsp:nvSpPr>
       <dsp:spPr>
         <a:xfrm>
-          <a:off x="0" y="2739833"/>
-          <a:ext cx="9604375" cy="959400"/>
+          <a:off x="0" y="1708991"/>
+          <a:ext cx="8909266" cy="585000"/>
         </a:xfrm>
         <a:prstGeom prst="roundRect">
           <a:avLst/>
@@ -4747,12 +4926,12 @@
         </a:fontRef>
       </dsp:style>
       <dsp:txBody>
-        <a:bodyPr spcFirstLastPara="0" vert="horz" wrap="square" lIns="156210" tIns="156210" rIns="156210" bIns="156210" numCol="1" spcCol="1270" anchor="ctr" anchorCtr="0">
+        <a:bodyPr spcFirstLastPara="0" vert="horz" wrap="square" lIns="95250" tIns="95250" rIns="95250" bIns="95250" numCol="1" spcCol="1270" anchor="ctr" anchorCtr="0">
           <a:noAutofit/>
         </a:bodyPr>
         <a:lstStyle/>
         <a:p>
-          <a:pPr marL="0" lvl="0" indent="0" algn="l" defTabSz="1822450">
+          <a:pPr marL="0" lvl="0" indent="0" algn="l" defTabSz="1111250">
             <a:lnSpc>
               <a:spcPct val="90000"/>
             </a:lnSpc>
@@ -4765,15 +4944,97 @@
             <a:buNone/>
           </a:pPr>
           <a:r>
-            <a:rPr lang="hu-HU" sz="4100" kern="1200"/>
-            <a:t>5 tables</a:t>
+            <a:rPr lang="hu-HU" sz="2500" kern="1200" dirty="0" err="1"/>
+            <a:t>PHPMyAdmin</a:t>
           </a:r>
-          <a:endParaRPr lang="en-US" sz="4100" kern="1200"/>
+          <a:endParaRPr lang="en-US" sz="2500" kern="1200" dirty="0"/>
         </a:p>
       </dsp:txBody>
       <dsp:txXfrm>
-        <a:off x="46834" y="2786667"/>
-        <a:ext cx="9510707" cy="865732"/>
+        <a:off x="28557" y="1737548"/>
+        <a:ext cx="8852152" cy="527886"/>
+      </dsp:txXfrm>
+    </dsp:sp>
+    <dsp:sp modelId="{33C0AEA7-5D4C-4E29-88C3-D72E9B8E4250}">
+      <dsp:nvSpPr>
+        <dsp:cNvPr id="0" name=""/>
+        <dsp:cNvSpPr/>
+      </dsp:nvSpPr>
+      <dsp:spPr>
+        <a:xfrm>
+          <a:off x="0" y="2365991"/>
+          <a:ext cx="8909266" cy="585000"/>
+        </a:xfrm>
+        <a:prstGeom prst="roundRect">
+          <a:avLst/>
+        </a:prstGeom>
+        <a:solidFill>
+          <a:schemeClr val="dk2">
+            <a:hueOff val="0"/>
+            <a:satOff val="0"/>
+            <a:lumOff val="0"/>
+            <a:alphaOff val="0"/>
+          </a:schemeClr>
+        </a:solidFill>
+        <a:ln w="15875" cap="flat" cmpd="sng" algn="ctr">
+          <a:solidFill>
+            <a:schemeClr val="lt2">
+              <a:hueOff val="0"/>
+              <a:satOff val="0"/>
+              <a:lumOff val="0"/>
+              <a:alphaOff val="0"/>
+            </a:schemeClr>
+          </a:solidFill>
+          <a:prstDash val="solid"/>
+        </a:ln>
+        <a:effectLst/>
+      </dsp:spPr>
+      <dsp:style>
+        <a:lnRef idx="2">
+          <a:scrgbClr r="0" g="0" b="0"/>
+        </a:lnRef>
+        <a:fillRef idx="1">
+          <a:scrgbClr r="0" g="0" b="0"/>
+        </a:fillRef>
+        <a:effectRef idx="0">
+          <a:scrgbClr r="0" g="0" b="0"/>
+        </a:effectRef>
+        <a:fontRef idx="minor">
+          <a:schemeClr val="lt1"/>
+        </a:fontRef>
+      </dsp:style>
+      <dsp:txBody>
+        <a:bodyPr spcFirstLastPara="0" vert="horz" wrap="square" lIns="95250" tIns="95250" rIns="95250" bIns="95250" numCol="1" spcCol="1270" anchor="ctr" anchorCtr="0">
+          <a:noAutofit/>
+        </a:bodyPr>
+        <a:lstStyle/>
+        <a:p>
+          <a:pPr marL="0" lvl="0" indent="0" algn="l" defTabSz="1111250">
+            <a:lnSpc>
+              <a:spcPct val="90000"/>
+            </a:lnSpc>
+            <a:spcBef>
+              <a:spcPct val="0"/>
+            </a:spcBef>
+            <a:spcAft>
+              <a:spcPct val="35000"/>
+            </a:spcAft>
+            <a:buNone/>
+          </a:pPr>
+          <a:r>
+            <a:rPr lang="hu-HU" sz="2500" kern="1200" dirty="0"/>
+            <a:t>5 </a:t>
+          </a:r>
+          <a:r>
+            <a:rPr lang="hu-HU" sz="2500" kern="1200" dirty="0" err="1"/>
+            <a:t>tables</a:t>
+          </a:r>
+          <a:endParaRPr lang="en-US" sz="2500" kern="1200" dirty="0"/>
+        </a:p>
+      </dsp:txBody>
+      <dsp:txXfrm>
+        <a:off x="28557" y="2394548"/>
+        <a:ext cx="8852152" cy="527886"/>
       </dsp:txXfrm>
     </dsp:sp>
   </dsp:spTree>
@@ -8522,7 +8783,7 @@
           <a:p>
             <a:fld id="{DD82B1F4-9425-4268-98EC-A420B44983D5}" type="datetimeFigureOut">
               <a:rPr lang="hu-HU" smtClean="0"/>
-              <a:t>2022. 04. 25.</a:t>
+              <a:t>2022. 04. 26.</a:t>
             </a:fld>
             <a:endParaRPr lang="hu-HU"/>
           </a:p>
@@ -8733,7 +8994,7 @@
           <a:p>
             <a:fld id="{DD82B1F4-9425-4268-98EC-A420B44983D5}" type="datetimeFigureOut">
               <a:rPr lang="hu-HU" smtClean="0"/>
-              <a:t>2022. 04. 25.</a:t>
+              <a:t>2022. 04. 26.</a:t>
             </a:fld>
             <a:endParaRPr lang="hu-HU"/>
           </a:p>
@@ -8948,7 +9209,7 @@
           <a:p>
             <a:fld id="{DD82B1F4-9425-4268-98EC-A420B44983D5}" type="datetimeFigureOut">
               <a:rPr lang="hu-HU" smtClean="0"/>
-              <a:t>2022. 04. 25.</a:t>
+              <a:t>2022. 04. 26.</a:t>
             </a:fld>
             <a:endParaRPr lang="hu-HU"/>
           </a:p>
@@ -9149,7 +9410,7 @@
           <a:p>
             <a:fld id="{DD82B1F4-9425-4268-98EC-A420B44983D5}" type="datetimeFigureOut">
               <a:rPr lang="hu-HU" smtClean="0"/>
-              <a:t>2022. 04. 25.</a:t>
+              <a:t>2022. 04. 26.</a:t>
             </a:fld>
             <a:endParaRPr lang="hu-HU"/>
           </a:p>
@@ -9428,7 +9689,7 @@
           <a:p>
             <a:fld id="{DD82B1F4-9425-4268-98EC-A420B44983D5}" type="datetimeFigureOut">
               <a:rPr lang="hu-HU" smtClean="0"/>
-              <a:t>2022. 04. 25.</a:t>
+              <a:t>2022. 04. 26.</a:t>
             </a:fld>
             <a:endParaRPr lang="hu-HU"/>
           </a:p>
@@ -9696,7 +9957,7 @@
           <a:p>
             <a:fld id="{DD82B1F4-9425-4268-98EC-A420B44983D5}" type="datetimeFigureOut">
               <a:rPr lang="hu-HU" smtClean="0"/>
-              <a:t>2022. 04. 25.</a:t>
+              <a:t>2022. 04. 26.</a:t>
             </a:fld>
             <a:endParaRPr lang="hu-HU"/>
           </a:p>
@@ -10112,7 +10373,7 @@
           <a:p>
             <a:fld id="{DD82B1F4-9425-4268-98EC-A420B44983D5}" type="datetimeFigureOut">
               <a:rPr lang="hu-HU" smtClean="0"/>
-              <a:t>2022. 04. 25.</a:t>
+              <a:t>2022. 04. 26.</a:t>
             </a:fld>
             <a:endParaRPr lang="hu-HU"/>
           </a:p>
@@ -10261,7 +10522,7 @@
           <a:p>
             <a:fld id="{DD82B1F4-9425-4268-98EC-A420B44983D5}" type="datetimeFigureOut">
               <a:rPr lang="hu-HU" smtClean="0"/>
-              <a:t>2022. 04. 25.</a:t>
+              <a:t>2022. 04. 26.</a:t>
             </a:fld>
             <a:endParaRPr lang="hu-HU"/>
           </a:p>
@@ -10387,7 +10648,7 @@
           <a:p>
             <a:fld id="{DD82B1F4-9425-4268-98EC-A420B44983D5}" type="datetimeFigureOut">
               <a:rPr lang="hu-HU" smtClean="0"/>
-              <a:t>2022. 04. 25.</a:t>
+              <a:t>2022. 04. 26.</a:t>
             </a:fld>
             <a:endParaRPr lang="hu-HU"/>
           </a:p>
@@ -10638,7 +10899,7 @@
           <a:p>
             <a:fld id="{DD82B1F4-9425-4268-98EC-A420B44983D5}" type="datetimeFigureOut">
               <a:rPr lang="hu-HU" smtClean="0"/>
-              <a:t>2022. 04. 25.</a:t>
+              <a:t>2022. 04. 26.</a:t>
             </a:fld>
             <a:endParaRPr lang="hu-HU"/>
           </a:p>
@@ -11083,7 +11344,7 @@
           <a:p>
             <a:fld id="{DD82B1F4-9425-4268-98EC-A420B44983D5}" type="datetimeFigureOut">
               <a:rPr lang="hu-HU" smtClean="0"/>
-              <a:t>2022. 04. 25.</a:t>
+              <a:t>2022. 04. 26.</a:t>
             </a:fld>
             <a:endParaRPr lang="hu-HU"/>
           </a:p>
@@ -11410,7 +11671,7 @@
           <a:p>
             <a:fld id="{DD82B1F4-9425-4268-98EC-A420B44983D5}" type="datetimeFigureOut">
               <a:rPr lang="hu-HU" smtClean="0"/>
-              <a:t>2022. 04. 25.</a:t>
+              <a:t>2022. 04. 26.</a:t>
             </a:fld>
             <a:endParaRPr lang="hu-HU"/>
           </a:p>
@@ -12654,7 +12915,7 @@
         </p:blipFill>
         <p:spPr>
           <a:xfrm>
-            <a:off x="3068881" y="2016125"/>
+            <a:off x="4879926" y="2152993"/>
             <a:ext cx="6368562" cy="3449638"/>
           </a:xfrm>
         </p:spPr>
@@ -12681,7 +12942,7 @@
         </p:blipFill>
         <p:spPr>
           <a:xfrm>
-            <a:off x="870723" y="2152993"/>
+            <a:off x="1030521" y="2028706"/>
             <a:ext cx="3354603" cy="4351338"/>
           </a:xfrm>
           <a:prstGeom prst="rect">
@@ -13031,21 +13292,6 @@
               <a:t>Google Drive</a:t>
             </a:r>
           </a:p>
-          <a:p>
-            <a:r>
-              <a:rPr lang="hu-HU" dirty="0" err="1"/>
-              <a:t>Clean</a:t>
-            </a:r>
-            <a:r>
-              <a:rPr lang="hu-HU" dirty="0"/>
-              <a:t> </a:t>
-            </a:r>
-            <a:r>
-              <a:rPr lang="hu-HU" dirty="0" err="1"/>
-              <a:t>code</a:t>
-            </a:r>
-            <a:endParaRPr lang="hu-HU" dirty="0"/>
-          </a:p>
         </p:txBody>
       </p:sp>
     </p:spTree>
@@ -13133,36 +13379,267 @@
         </p:nvSpPr>
         <p:spPr/>
         <p:txBody>
-          <a:bodyPr/>
+          <a:bodyPr>
+            <a:normAutofit/>
+          </a:bodyPr>
           <a:lstStyle/>
           <a:p>
             <a:r>
               <a:rPr lang="hu-HU" dirty="0"/>
-              <a:t>Backend, React, Postman testing</a:t>
+              <a:t>Móricz János Milán</a:t>
             </a:r>
           </a:p>
           <a:p>
             <a:r>
               <a:rPr lang="hu-HU" dirty="0"/>
-              <a:t>Móricz János Milán</a:t>
-            </a:r>
-          </a:p>
-          <a:p>
+              <a:t>Backend: </a:t>
+            </a:r>
+            <a:r>
+              <a:rPr lang="hu-HU" dirty="0" err="1"/>
+              <a:t>Creating</a:t>
+            </a:r>
             <a:r>
               <a:rPr lang="hu-HU" dirty="0"/>
-              <a:t>React test, </a:t>
+              <a:t> </a:t>
             </a:r>
             <a:r>
               <a:rPr lang="hu-HU" dirty="0" err="1"/>
               <a:t>database</a:t>
+            </a:r>
+            <a:r>
+              <a:rPr lang="hu-HU" dirty="0"/>
+              <a:t> </a:t>
+            </a:r>
+            <a:r>
+              <a:rPr lang="hu-HU" dirty="0" err="1"/>
+              <a:t>connection</a:t>
+            </a:r>
+            <a:r>
+              <a:rPr lang="hu-HU" dirty="0"/>
+              <a:t>, </a:t>
+            </a:r>
+            <a:r>
+              <a:rPr lang="hu-HU" dirty="0" err="1"/>
+              <a:t>multer</a:t>
+            </a:r>
+            <a:r>
+              <a:rPr lang="hu-HU" dirty="0"/>
+              <a:t> </a:t>
+            </a:r>
+            <a:r>
+              <a:rPr lang="hu-HU" dirty="0" err="1"/>
+              <a:t>storage</a:t>
+            </a:r>
+            <a:r>
+              <a:rPr lang="hu-HU" dirty="0"/>
+              <a:t>, GET, DELETE, PUT, POST </a:t>
+            </a:r>
+            <a:r>
+              <a:rPr lang="hu-HU" dirty="0" err="1"/>
+              <a:t>requests</a:t>
+            </a:r>
+            <a:r>
+              <a:rPr lang="hu-HU" dirty="0"/>
+              <a:t>, JWT </a:t>
+            </a:r>
+            <a:r>
+              <a:rPr lang="hu-HU" dirty="0" err="1"/>
+              <a:t>token</a:t>
+            </a:r>
+            <a:r>
+              <a:rPr lang="hu-HU" dirty="0"/>
+              <a:t>, </a:t>
+            </a:r>
+            <a:r>
+              <a:rPr lang="hu-HU" dirty="0" err="1"/>
+              <a:t>bcrypt</a:t>
             </a:r>
             <a:endParaRPr lang="hu-HU" dirty="0"/>
           </a:p>
           <a:p>
             <a:r>
               <a:rPr lang="hu-HU" dirty="0"/>
-              <a:t>Lévai Levente</a:t>
-            </a:r>
+              <a:t>React: </a:t>
+            </a:r>
+            <a:r>
+              <a:rPr lang="hu-HU" dirty="0" err="1"/>
+              <a:t>Contexts</a:t>
+            </a:r>
+            <a:r>
+              <a:rPr lang="hu-HU" dirty="0"/>
+              <a:t>, register, login, </a:t>
+            </a:r>
+            <a:r>
+              <a:rPr lang="hu-HU" dirty="0" err="1"/>
+              <a:t>ckeckout</a:t>
+            </a:r>
+            <a:r>
+              <a:rPr lang="hu-HU" dirty="0"/>
+              <a:t>, </a:t>
+            </a:r>
+            <a:r>
+              <a:rPr lang="hu-HU" dirty="0" err="1"/>
+              <a:t>orders</a:t>
+            </a:r>
+            <a:r>
+              <a:rPr lang="hu-HU" dirty="0"/>
+              <a:t>, </a:t>
+            </a:r>
+            <a:r>
+              <a:rPr lang="hu-HU" dirty="0" err="1"/>
+              <a:t>create</a:t>
+            </a:r>
+            <a:r>
+              <a:rPr lang="hu-HU" dirty="0"/>
+              <a:t> </a:t>
+            </a:r>
+            <a:r>
+              <a:rPr lang="hu-HU" dirty="0" err="1"/>
+              <a:t>product</a:t>
+            </a:r>
+            <a:r>
+              <a:rPr lang="hu-HU" dirty="0"/>
+              <a:t>, </a:t>
+            </a:r>
+            <a:r>
+              <a:rPr lang="hu-HU" dirty="0" err="1"/>
+              <a:t>edit</a:t>
+            </a:r>
+            <a:r>
+              <a:rPr lang="hu-HU" dirty="0"/>
+              <a:t> </a:t>
+            </a:r>
+            <a:r>
+              <a:rPr lang="hu-HU" dirty="0" err="1"/>
+              <a:t>entries</a:t>
+            </a:r>
+            <a:r>
+              <a:rPr lang="hu-HU" dirty="0"/>
+              <a:t>, </a:t>
+            </a:r>
+            <a:r>
+              <a:rPr lang="hu-HU" dirty="0" err="1"/>
+              <a:t>edit</a:t>
+            </a:r>
+            <a:r>
+              <a:rPr lang="hu-HU" dirty="0"/>
+              <a:t> </a:t>
+            </a:r>
+            <a:r>
+              <a:rPr lang="hu-HU" dirty="0" err="1"/>
+              <a:t>products</a:t>
+            </a:r>
+            <a:r>
+              <a:rPr lang="hu-HU" dirty="0"/>
+              <a:t>, </a:t>
+            </a:r>
+            <a:r>
+              <a:rPr lang="hu-HU" dirty="0" err="1"/>
+              <a:t>edit</a:t>
+            </a:r>
+            <a:r>
+              <a:rPr lang="hu-HU" dirty="0"/>
+              <a:t> </a:t>
+            </a:r>
+            <a:r>
+              <a:rPr lang="hu-HU" dirty="0" err="1"/>
+              <a:t>user</a:t>
+            </a:r>
+            <a:r>
+              <a:rPr lang="hu-HU" dirty="0"/>
+              <a:t>, </a:t>
+            </a:r>
+            <a:r>
+              <a:rPr lang="hu-HU" dirty="0" err="1"/>
+              <a:t>entries</a:t>
+            </a:r>
+            <a:r>
+              <a:rPr lang="hu-HU" dirty="0"/>
+              <a:t>, logout, </a:t>
+            </a:r>
+            <a:r>
+              <a:rPr lang="hu-HU" dirty="0" err="1"/>
+              <a:t>products</a:t>
+            </a:r>
+            <a:r>
+              <a:rPr lang="hu-HU" dirty="0"/>
+              <a:t>, </a:t>
+            </a:r>
+            <a:r>
+              <a:rPr lang="hu-HU" dirty="0" err="1"/>
+              <a:t>product</a:t>
+            </a:r>
+            <a:r>
+              <a:rPr lang="hu-HU" dirty="0"/>
+              <a:t>, </a:t>
+            </a:r>
+            <a:r>
+              <a:rPr lang="hu-HU" dirty="0" err="1"/>
+              <a:t>profile</a:t>
+            </a:r>
+            <a:r>
+              <a:rPr lang="hu-HU" dirty="0"/>
+              <a:t>, shopping </a:t>
+            </a:r>
+            <a:r>
+              <a:rPr lang="hu-HU" dirty="0" err="1"/>
+              <a:t>cart</a:t>
+            </a:r>
+            <a:r>
+              <a:rPr lang="hu-HU" dirty="0"/>
+              <a:t>, </a:t>
+            </a:r>
+            <a:r>
+              <a:rPr lang="hu-HU" dirty="0" err="1"/>
+              <a:t>users</a:t>
+            </a:r>
+            <a:r>
+              <a:rPr lang="hu-HU" dirty="0"/>
+              <a:t> </a:t>
+            </a:r>
+            <a:r>
+              <a:rPr lang="hu-HU" dirty="0" err="1"/>
+              <a:t>pages</a:t>
+            </a:r>
+            <a:r>
+              <a:rPr lang="hu-HU" dirty="0"/>
+              <a:t>, </a:t>
+            </a:r>
+            <a:r>
+              <a:rPr lang="hu-HU" dirty="0" err="1"/>
+              <a:t>routing</a:t>
+            </a:r>
+            <a:r>
+              <a:rPr lang="hu-HU" dirty="0"/>
+              <a:t>, </a:t>
+            </a:r>
+            <a:r>
+              <a:rPr lang="hu-HU" dirty="0" err="1"/>
+              <a:t>Bootstrap</a:t>
+            </a:r>
+            <a:endParaRPr lang="hu-HU" dirty="0"/>
+          </a:p>
+          <a:p>
+            <a:r>
+              <a:rPr lang="hu-HU" dirty="0"/>
+              <a:t>Backend testing: Postman </a:t>
+            </a:r>
+            <a:r>
+              <a:rPr lang="hu-HU" dirty="0" err="1"/>
+              <a:t>collection</a:t>
+            </a:r>
+            <a:r>
+              <a:rPr lang="hu-HU" dirty="0"/>
+              <a:t> </a:t>
+            </a:r>
+            <a:r>
+              <a:rPr lang="hu-HU" dirty="0" err="1"/>
+              <a:t>tests</a:t>
+            </a:r>
+            <a:endParaRPr lang="hu-HU" dirty="0"/>
+          </a:p>
+          <a:p>
+            <a:endParaRPr lang="hu-HU" dirty="0"/>
           </a:p>
         </p:txBody>
       </p:sp>
@@ -13180,6 +13657,201 @@
 </file>
 
 <file path=ppt/slides/slide15.xml><?xml version="1.0" encoding="utf-8"?>
+<p:sld xmlns:a="http://schemas.openxmlformats.org/drawingml/2006/main" xmlns:r="http://schemas.openxmlformats.org/officeDocument/2006/relationships" xmlns:p="http://schemas.openxmlformats.org/presentationml/2006/main">
+  <p:cSld>
+    <p:spTree>
+      <p:nvGrpSpPr>
+        <p:cNvPr id="1" name=""/>
+        <p:cNvGrpSpPr/>
+        <p:nvPr/>
+      </p:nvGrpSpPr>
+      <p:grpSpPr>
+        <a:xfrm>
+          <a:off x="0" y="0"/>
+          <a:ext cx="0" cy="0"/>
+          <a:chOff x="0" y="0"/>
+          <a:chExt cx="0" cy="0"/>
+        </a:xfrm>
+      </p:grpSpPr>
+      <p:sp>
+        <p:nvSpPr>
+          <p:cNvPr id="2" name="Cím 1">
+            <a:extLst>
+              <a:ext uri="{FF2B5EF4-FFF2-40B4-BE49-F238E27FC236}">
+                <a16:creationId xmlns:a16="http://schemas.microsoft.com/office/drawing/2014/main" id="{919D0973-B1A0-4735-B093-83E5D81858DD}"/>
+              </a:ext>
+            </a:extLst>
+          </p:cNvPr>
+          <p:cNvSpPr>
+            <a:spLocks noGrp="1"/>
+          </p:cNvSpPr>
+          <p:nvPr>
+            <p:ph type="title"/>
+          </p:nvPr>
+        </p:nvSpPr>
+        <p:spPr/>
+        <p:txBody>
+          <a:bodyPr/>
+          <a:lstStyle/>
+          <a:p>
+            <a:r>
+              <a:rPr lang="hu-HU" b="1" dirty="0" err="1"/>
+              <a:t>Teamwork</a:t>
+            </a:r>
+            <a:r>
+              <a:rPr lang="hu-HU" b="1" dirty="0"/>
+              <a:t> </a:t>
+            </a:r>
+            <a:r>
+              <a:rPr lang="hu-HU" b="1" dirty="0" err="1"/>
+              <a:t>tasks</a:t>
+            </a:r>
+            <a:endParaRPr lang="hu-HU" b="1" dirty="0"/>
+          </a:p>
+        </p:txBody>
+      </p:sp>
+      <p:sp>
+        <p:nvSpPr>
+          <p:cNvPr id="3" name="Tartalom helye 2">
+            <a:extLst>
+              <a:ext uri="{FF2B5EF4-FFF2-40B4-BE49-F238E27FC236}">
+                <a16:creationId xmlns:a16="http://schemas.microsoft.com/office/drawing/2014/main" id="{49E16695-CE94-43B3-BE59-26AEA0041551}"/>
+              </a:ext>
+            </a:extLst>
+          </p:cNvPr>
+          <p:cNvSpPr>
+            <a:spLocks noGrp="1"/>
+          </p:cNvSpPr>
+          <p:nvPr>
+            <p:ph idx="1"/>
+          </p:nvPr>
+        </p:nvSpPr>
+        <p:spPr/>
+        <p:txBody>
+          <a:bodyPr/>
+          <a:lstStyle/>
+          <a:p>
+            <a:r>
+              <a:rPr lang="hu-HU" dirty="0"/>
+              <a:t>Lévai Levente</a:t>
+            </a:r>
+          </a:p>
+          <a:p>
+            <a:r>
+              <a:rPr lang="hu-HU" dirty="0"/>
+              <a:t>React: </a:t>
+            </a:r>
+            <a:r>
+              <a:rPr lang="hu-HU" dirty="0" err="1"/>
+              <a:t>Contacts</a:t>
+            </a:r>
+            <a:r>
+              <a:rPr lang="hu-HU" dirty="0"/>
+              <a:t> </a:t>
+            </a:r>
+            <a:r>
+              <a:rPr lang="hu-HU" dirty="0" err="1"/>
+              <a:t>page</a:t>
+            </a:r>
+            <a:endParaRPr lang="hu-HU" dirty="0"/>
+          </a:p>
+          <a:p>
+            <a:r>
+              <a:rPr lang="hu-HU" dirty="0"/>
+              <a:t>React test:  </a:t>
+            </a:r>
+            <a:r>
+              <a:rPr lang="hu-HU" dirty="0" err="1"/>
+              <a:t>Axios</a:t>
+            </a:r>
+            <a:r>
+              <a:rPr lang="hu-HU" dirty="0"/>
+              <a:t> </a:t>
+            </a:r>
+            <a:r>
+              <a:rPr lang="hu-HU" dirty="0" err="1"/>
+              <a:t>tests</a:t>
+            </a:r>
+            <a:endParaRPr lang="hu-HU" dirty="0"/>
+          </a:p>
+          <a:p>
+            <a:r>
+              <a:rPr lang="hu-HU" dirty="0" err="1"/>
+              <a:t>Style</a:t>
+            </a:r>
+            <a:r>
+              <a:rPr lang="hu-HU" dirty="0"/>
+              <a:t>: CSS </a:t>
+            </a:r>
+            <a:r>
+              <a:rPr lang="hu-HU" dirty="0" err="1"/>
+              <a:t>files</a:t>
+            </a:r>
+            <a:r>
+              <a:rPr lang="hu-HU" dirty="0"/>
+              <a:t>, </a:t>
+            </a:r>
+            <a:r>
+              <a:rPr lang="hu-HU" dirty="0" err="1"/>
+              <a:t>Bootstrap</a:t>
+            </a:r>
+            <a:endParaRPr lang="hu-HU" dirty="0"/>
+          </a:p>
+          <a:p>
+            <a:r>
+              <a:rPr lang="hu-HU" dirty="0" err="1"/>
+              <a:t>Database</a:t>
+            </a:r>
+            <a:r>
+              <a:rPr lang="hu-HU" dirty="0"/>
+              <a:t>: </a:t>
+            </a:r>
+            <a:r>
+              <a:rPr lang="hu-HU" dirty="0" err="1"/>
+              <a:t>MySQL</a:t>
+            </a:r>
+            <a:r>
+              <a:rPr lang="hu-HU" dirty="0"/>
+              <a:t> </a:t>
+            </a:r>
+            <a:r>
+              <a:rPr lang="hu-HU" dirty="0" err="1"/>
+              <a:t>database</a:t>
+            </a:r>
+            <a:r>
+              <a:rPr lang="hu-HU" dirty="0"/>
+              <a:t> </a:t>
+            </a:r>
+            <a:r>
+              <a:rPr lang="hu-HU" dirty="0" err="1"/>
+              <a:t>on</a:t>
+            </a:r>
+            <a:r>
+              <a:rPr lang="hu-HU" dirty="0"/>
+              <a:t> a </a:t>
+            </a:r>
+            <a:r>
+              <a:rPr lang="hu-HU" dirty="0" err="1"/>
+              <a:t>PHPMyAdmin</a:t>
+            </a:r>
+            <a:endParaRPr lang="hu-HU" dirty="0"/>
+          </a:p>
+        </p:txBody>
+      </p:sp>
+    </p:spTree>
+    <p:extLst>
+      <p:ext uri="{BB962C8B-B14F-4D97-AF65-F5344CB8AC3E}">
+        <p14:creationId xmlns:p14="http://schemas.microsoft.com/office/powerpoint/2010/main" val="1938985341"/>
+      </p:ext>
+    </p:extLst>
+  </p:cSld>
+  <p:clrMapOvr>
+    <a:masterClrMapping/>
+  </p:clrMapOvr>
+</p:sld>
+</file>
+
+<file path=ppt/slides/slide16.xml><?xml version="1.0" encoding="utf-8"?>
 <p:sld xmlns:a="http://schemas.openxmlformats.org/drawingml/2006/main" xmlns:r="http://schemas.openxmlformats.org/officeDocument/2006/relationships" xmlns:p="http://schemas.openxmlformats.org/presentationml/2006/main">
   <p:cSld>
     <p:bg>
@@ -13383,7 +14055,7 @@
 </p:sld>
 </file>
 
-<file path=ppt/slides/slide16.xml><?xml version="1.0" encoding="utf-8"?>
+<file path=ppt/slides/slide17.xml><?xml version="1.0" encoding="utf-8"?>
 <p:sld xmlns:a="http://schemas.openxmlformats.org/drawingml/2006/main" xmlns:r="http://schemas.openxmlformats.org/officeDocument/2006/relationships" xmlns:p="http://schemas.openxmlformats.org/presentationml/2006/main">
   <p:cSld>
     <p:bg>
@@ -13442,7 +14114,7 @@
         </p:nvSpPr>
         <p:spPr>
           <a:xfrm>
-            <a:off x="1557071" y="1584552"/>
+            <a:off x="2125242" y="1788738"/>
             <a:ext cx="9099255" cy="2537251"/>
           </a:xfrm>
         </p:spPr>
@@ -13454,13 +14126,34 @@
           <a:p>
             <a:pPr algn="ctr"/>
             <a:r>
-              <a:rPr lang="hu-HU" sz="6700" b="1">
+              <a:rPr lang="hu-HU" sz="6700" b="1" dirty="0" err="1">
                 <a:solidFill>
                   <a:srgbClr val="454545"/>
                 </a:solidFill>
               </a:rPr>
-              <a:t>Thank you for your attention!</a:t>
-            </a:r>
+              <a:t>Techshop</a:t>
+            </a:r>
+            <a:r>
+              <a:rPr lang="hu-HU" sz="6700" b="1" dirty="0">
+                <a:solidFill>
+                  <a:srgbClr val="454545"/>
+                </a:solidFill>
+              </a:rPr>
+              <a:t> </a:t>
+            </a:r>
+            <a:r>
+              <a:rPr lang="hu-HU" sz="6700" b="1" dirty="0" err="1">
+                <a:solidFill>
+                  <a:srgbClr val="454545"/>
+                </a:solidFill>
+              </a:rPr>
+              <a:t>demo</a:t>
+            </a:r>
+            <a:endParaRPr lang="hu-HU" sz="6700" b="1" dirty="0">
+              <a:solidFill>
+                <a:srgbClr val="454545"/>
+              </a:solidFill>
+            </a:endParaRPr>
           </a:p>
         </p:txBody>
       </p:sp>
@@ -13600,7 +14293,7 @@
             </a:r>
             <a:r>
               <a:rPr lang="hu-HU" dirty="0" err="1"/>
-              <a:t>iinformation</a:t>
+              <a:t>information</a:t>
             </a:r>
             <a:r>
               <a:rPr lang="hu-HU" dirty="0"/>
@@ -13902,6 +14595,13 @@
           <a:p>
             <a:r>
               <a:rPr lang="hu-HU" dirty="0" err="1"/>
+              <a:t>Techshop</a:t>
+            </a:r>
+            <a:endParaRPr lang="hu-HU" dirty="0"/>
+          </a:p>
+          <a:p>
+            <a:r>
+              <a:rPr lang="hu-HU" dirty="0" err="1"/>
               <a:t>Our</a:t>
             </a:r>
             <a:r>
@@ -14052,13 +14752,13 @@
             <p:ph idx="1"/>
             <p:extLst>
               <p:ext uri="{D42A27DB-BD31-4B8C-83A1-F6EECF244321}">
-                <p14:modId xmlns:p14="http://schemas.microsoft.com/office/powerpoint/2010/main" val="1499241127"/>
+                <p14:modId xmlns:p14="http://schemas.microsoft.com/office/powerpoint/2010/main" val="2780080807"/>
               </p:ext>
             </p:extLst>
           </p:nvPr>
         </p:nvGraphicFramePr>
         <p:xfrm>
-          <a:off x="1450975" y="2340435"/>
+          <a:off x="1452075" y="2065228"/>
           <a:ext cx="9604375" cy="3324494"/>
         </p:xfrm>
         <a:graphic>
@@ -14067,6 +14767,163 @@
           </a:graphicData>
         </a:graphic>
       </p:graphicFrame>
+      <p:grpSp>
+        <p:nvGrpSpPr>
+          <p:cNvPr id="4" name="Csoportba foglalás 3">
+            <a:extLst>
+              <a:ext uri="{FF2B5EF4-FFF2-40B4-BE49-F238E27FC236}">
+                <a16:creationId xmlns:a16="http://schemas.microsoft.com/office/drawing/2014/main" id="{420E9C50-7420-4523-ACB5-2ED3437103A1}"/>
+              </a:ext>
+            </a:extLst>
+          </p:cNvPr>
+          <p:cNvGrpSpPr/>
+          <p:nvPr/>
+        </p:nvGrpSpPr>
+        <p:grpSpPr>
+          <a:xfrm>
+            <a:off x="1451579" y="5389722"/>
+            <a:ext cx="9604375" cy="491399"/>
+            <a:chOff x="0" y="2796247"/>
+            <a:chExt cx="9604375" cy="491399"/>
+          </a:xfrm>
+        </p:grpSpPr>
+        <p:sp>
+          <p:nvSpPr>
+            <p:cNvPr id="5" name="Téglalap: lekerekített 4">
+              <a:extLst>
+                <a:ext uri="{FF2B5EF4-FFF2-40B4-BE49-F238E27FC236}">
+                  <a16:creationId xmlns:a16="http://schemas.microsoft.com/office/drawing/2014/main" id="{70019DD3-2E04-4142-820A-93C6824B9144}"/>
+                </a:ext>
+              </a:extLst>
+            </p:cNvPr>
+            <p:cNvSpPr/>
+            <p:nvPr/>
+          </p:nvSpPr>
+          <p:spPr>
+            <a:xfrm>
+              <a:off x="0" y="2796247"/>
+              <a:ext cx="9604375" cy="491399"/>
+            </a:xfrm>
+            <a:prstGeom prst="roundRect">
+              <a:avLst/>
+            </a:prstGeom>
+          </p:spPr>
+          <p:style>
+            <a:lnRef idx="0">
+              <a:schemeClr val="lt2">
+                <a:hueOff val="0"/>
+                <a:satOff val="0"/>
+                <a:lumOff val="0"/>
+                <a:alphaOff val="0"/>
+              </a:schemeClr>
+            </a:lnRef>
+            <a:fillRef idx="3">
+              <a:schemeClr val="dk2">
+                <a:hueOff val="0"/>
+                <a:satOff val="0"/>
+                <a:lumOff val="0"/>
+                <a:alphaOff val="0"/>
+              </a:schemeClr>
+            </a:fillRef>
+            <a:effectRef idx="2">
+              <a:schemeClr val="dk2">
+                <a:hueOff val="0"/>
+                <a:satOff val="0"/>
+                <a:lumOff val="0"/>
+                <a:alphaOff val="0"/>
+              </a:schemeClr>
+            </a:effectRef>
+            <a:fontRef idx="minor">
+              <a:schemeClr val="lt1"/>
+            </a:fontRef>
+          </p:style>
+        </p:sp>
+        <p:sp>
+          <p:nvSpPr>
+            <p:cNvPr id="6" name="Téglalap: lekerekített 4">
+              <a:extLst>
+                <a:ext uri="{FF2B5EF4-FFF2-40B4-BE49-F238E27FC236}">
+                  <a16:creationId xmlns:a16="http://schemas.microsoft.com/office/drawing/2014/main" id="{BD95C437-F076-4435-BD65-06EDFB122565}"/>
+                </a:ext>
+              </a:extLst>
+            </p:cNvPr>
+            <p:cNvSpPr txBox="1"/>
+            <p:nvPr/>
+          </p:nvSpPr>
+          <p:spPr>
+            <a:xfrm>
+              <a:off x="23988" y="2820235"/>
+              <a:ext cx="9556399" cy="443423"/>
+            </a:xfrm>
+            <a:prstGeom prst="rect">
+              <a:avLst/>
+            </a:prstGeom>
+          </p:spPr>
+          <p:style>
+            <a:lnRef idx="0">
+              <a:scrgbClr r="0" g="0" b="0"/>
+            </a:lnRef>
+            <a:fillRef idx="0">
+              <a:scrgbClr r="0" g="0" b="0"/>
+            </a:fillRef>
+            <a:effectRef idx="0">
+              <a:scrgbClr r="0" g="0" b="0"/>
+            </a:effectRef>
+            <a:fontRef idx="minor">
+              <a:schemeClr val="lt1"/>
+            </a:fontRef>
+          </p:style>
+          <p:txBody>
+            <a:bodyPr spcFirstLastPara="0" vert="horz" wrap="square" lIns="80010" tIns="80010" rIns="80010" bIns="80010" numCol="1" spcCol="1270" anchor="ctr" anchorCtr="0">
+              <a:noAutofit/>
+            </a:bodyPr>
+            <a:lstStyle/>
+            <a:p>
+              <a:pPr marL="0" lvl="0" indent="0" algn="l" defTabSz="933450">
+                <a:lnSpc>
+                  <a:spcPct val="90000"/>
+                </a:lnSpc>
+                <a:spcBef>
+                  <a:spcPct val="0"/>
+                </a:spcBef>
+                <a:spcAft>
+                  <a:spcPct val="35000"/>
+                </a:spcAft>
+                <a:buNone/>
+              </a:pPr>
+              <a:r>
+                <a:rPr lang="hu-HU" sz="2100" dirty="0" err="1"/>
+                <a:t>Can</a:t>
+              </a:r>
+              <a:r>
+                <a:rPr lang="hu-HU" sz="2100" dirty="0"/>
+                <a:t> </a:t>
+              </a:r>
+              <a:r>
+                <a:rPr lang="hu-HU" sz="2100" dirty="0" err="1"/>
+                <a:t>browse</a:t>
+              </a:r>
+              <a:r>
+                <a:rPr lang="hu-HU" sz="2100" dirty="0"/>
+                <a:t> </a:t>
+              </a:r>
+              <a:r>
+                <a:rPr lang="hu-HU" sz="2100" dirty="0" err="1"/>
+                <a:t>between</a:t>
+              </a:r>
+              <a:r>
+                <a:rPr lang="hu-HU" sz="2100" dirty="0"/>
+                <a:t> </a:t>
+              </a:r>
+              <a:r>
+                <a:rPr lang="hu-HU" sz="2100" dirty="0" err="1"/>
+                <a:t>entries</a:t>
+              </a:r>
+              <a:endParaRPr lang="hu-HU" sz="2100" kern="1200" dirty="0"/>
+            </a:p>
+          </p:txBody>
+        </p:sp>
+      </p:grpSp>
     </p:spTree>
     <p:extLst>
       <p:ext uri="{BB962C8B-B14F-4D97-AF65-F5344CB8AC3E}">
@@ -14318,7 +15175,7 @@
         </p:nvSpPr>
         <p:spPr>
           <a:xfrm>
-            <a:off x="1204848" y="2034656"/>
+            <a:off x="1323813" y="2017897"/>
             <a:ext cx="3932237" cy="4247147"/>
           </a:xfrm>
         </p:spPr>
@@ -14334,6 +15191,24 @@
             </a:pPr>
             <a:r>
               <a:rPr lang="hu-HU" sz="2800" dirty="0" err="1"/>
+              <a:t>Node</a:t>
+            </a:r>
+            <a:r>
+              <a:rPr lang="hu-HU" sz="2800"/>
+              <a:t> 16.13.1.</a:t>
+            </a:r>
+            <a:r>
+              <a:rPr lang="hu-HU" sz="2800" dirty="0"/>
+              <a:t>v.</a:t>
+            </a:r>
+          </a:p>
+          <a:p>
+            <a:pPr marL="285750" indent="-285750">
+              <a:buFont typeface="Arial" panose="020B0604020202020204" pitchFamily="34" charset="0"/>
+              <a:buChar char="•"/>
+            </a:pPr>
+            <a:r>
+              <a:rPr lang="hu-HU" sz="2800" dirty="0" err="1"/>
               <a:t>Modules</a:t>
             </a:r>
             <a:endParaRPr lang="hu-HU" sz="2800" dirty="0"/>
@@ -14425,14 +15300,6 @@
             <a:r>
               <a:rPr lang="hu-HU" sz="2800" dirty="0" err="1"/>
               <a:t>token</a:t>
-            </a:r>
-            <a:r>
-              <a:rPr lang="hu-HU" sz="2800" dirty="0"/>
-              <a:t> </a:t>
-            </a:r>
-            <a:r>
-              <a:rPr lang="hu-HU" sz="2800" dirty="0" err="1"/>
-              <a:t>authentication</a:t>
             </a:r>
             <a:endParaRPr lang="hu-HU" sz="2800" dirty="0"/>
           </a:p>
@@ -14593,6 +15460,36 @@
           <a:chExt cx="0" cy="0"/>
         </a:xfrm>
       </p:grpSpPr>
+      <p:pic>
+        <p:nvPicPr>
+          <p:cNvPr id="6" name="Kép 5">
+            <a:extLst>
+              <a:ext uri="{FF2B5EF4-FFF2-40B4-BE49-F238E27FC236}">
+                <a16:creationId xmlns:a16="http://schemas.microsoft.com/office/drawing/2014/main" id="{AEA78DAE-32F0-41CD-91D9-2316474E64DB}"/>
+              </a:ext>
+            </a:extLst>
+          </p:cNvPr>
+          <p:cNvPicPr>
+            <a:picLocks noChangeAspect="1"/>
+          </p:cNvPicPr>
+          <p:nvPr/>
+        </p:nvPicPr>
+        <p:blipFill>
+          <a:blip r:embed="rId2"/>
+          <a:stretch>
+            <a:fillRect/>
+          </a:stretch>
+        </p:blipFill>
+        <p:spPr>
+          <a:xfrm>
+            <a:off x="1451580" y="3055220"/>
+            <a:ext cx="3414090" cy="600159"/>
+          </a:xfrm>
+          <a:prstGeom prst="rect">
+            <a:avLst/>
+          </a:prstGeom>
+        </p:spPr>
+      </p:pic>
       <p:sp>
         <p:nvSpPr>
           <p:cNvPr id="2" name="Cím 1">
@@ -14645,7 +15542,7 @@
           </p:nvPr>
         </p:nvPicPr>
         <p:blipFill>
-          <a:blip r:embed="rId2"/>
+          <a:blip r:embed="rId3"/>
           <a:stretch>
             <a:fillRect/>
           </a:stretch>
@@ -14696,6 +15593,11 @@
               <a:rPr lang="en-US" sz="2800" dirty="0"/>
               <a:t>React</a:t>
             </a:r>
+            <a:r>
+              <a:rPr lang="hu-HU" sz="2800" dirty="0"/>
+              <a:t> 17.0.2.v.</a:t>
+            </a:r>
+            <a:endParaRPr lang="en-US" sz="2800" dirty="0"/>
           </a:p>
           <a:p>
             <a:pPr marL="285750" indent="-228600">
@@ -14764,7 +15666,7 @@
           <p:nvPr/>
         </p:nvPicPr>
         <p:blipFill>
-          <a:blip r:embed="rId3"/>
+          <a:blip r:embed="rId4"/>
           <a:stretch>
             <a:fillRect/>
           </a:stretch>
@@ -14880,14 +15782,14 @@
             <p:ph idx="1"/>
             <p:extLst>
               <p:ext uri="{D42A27DB-BD31-4B8C-83A1-F6EECF244321}">
-                <p14:modId xmlns:p14="http://schemas.microsoft.com/office/powerpoint/2010/main" val="3730684763"/>
+                <p14:modId xmlns:p14="http://schemas.microsoft.com/office/powerpoint/2010/main" val="421051811"/>
               </p:ext>
             </p:extLst>
           </p:nvPr>
         </p:nvGraphicFramePr>
         <p:xfrm>
-          <a:off x="1450975" y="2331497"/>
-          <a:ext cx="9604375" cy="3723227"/>
+          <a:off x="1450976" y="2331497"/>
+          <a:ext cx="8909266" cy="3003983"/>
         </p:xfrm>
         <a:graphic>
           <a:graphicData uri="http://schemas.openxmlformats.org/drawingml/2006/diagram">

</xml_diff>

<commit_message>
Dokumentumok átnézése, prezentáció átnézve, node modules mappák törlve
</commit_message>
<xml_diff>
--- a/project dokumentumok/Projekt bemutató.pptx
+++ b/project dokumentumok/Projekt bemutató.pptx
@@ -3348,7 +3348,7 @@
         <a:p>
           <a:r>
             <a:rPr lang="hu-HU" dirty="0" err="1"/>
-            <a:t>PHPMyAdmin</a:t>
+            <a:t>phpMyAdmin</a:t>
           </a:r>
           <a:endParaRPr lang="en-US" dirty="0"/>
         </a:p>
@@ -4945,7 +4945,7 @@
           </a:pPr>
           <a:r>
             <a:rPr lang="hu-HU" sz="2500" kern="1200" dirty="0" err="1"/>
-            <a:t>PHPMyAdmin</a:t>
+            <a:t>phpMyAdmin</a:t>
           </a:r>
           <a:endParaRPr lang="en-US" sz="2500" kern="1200" dirty="0"/>
         </a:p>
@@ -8783,7 +8783,7 @@
           <a:p>
             <a:fld id="{DD82B1F4-9425-4268-98EC-A420B44983D5}" type="datetimeFigureOut">
               <a:rPr lang="hu-HU" smtClean="0"/>
-              <a:t>2022. 04. 26.</a:t>
+              <a:t>2022. 04. 27.</a:t>
             </a:fld>
             <a:endParaRPr lang="hu-HU"/>
           </a:p>
@@ -8994,7 +8994,7 @@
           <a:p>
             <a:fld id="{DD82B1F4-9425-4268-98EC-A420B44983D5}" type="datetimeFigureOut">
               <a:rPr lang="hu-HU" smtClean="0"/>
-              <a:t>2022. 04. 26.</a:t>
+              <a:t>2022. 04. 27.</a:t>
             </a:fld>
             <a:endParaRPr lang="hu-HU"/>
           </a:p>
@@ -9209,7 +9209,7 @@
           <a:p>
             <a:fld id="{DD82B1F4-9425-4268-98EC-A420B44983D5}" type="datetimeFigureOut">
               <a:rPr lang="hu-HU" smtClean="0"/>
-              <a:t>2022. 04. 26.</a:t>
+              <a:t>2022. 04. 27.</a:t>
             </a:fld>
             <a:endParaRPr lang="hu-HU"/>
           </a:p>
@@ -9410,7 +9410,7 @@
           <a:p>
             <a:fld id="{DD82B1F4-9425-4268-98EC-A420B44983D5}" type="datetimeFigureOut">
               <a:rPr lang="hu-HU" smtClean="0"/>
-              <a:t>2022. 04. 26.</a:t>
+              <a:t>2022. 04. 27.</a:t>
             </a:fld>
             <a:endParaRPr lang="hu-HU"/>
           </a:p>
@@ -9689,7 +9689,7 @@
           <a:p>
             <a:fld id="{DD82B1F4-9425-4268-98EC-A420B44983D5}" type="datetimeFigureOut">
               <a:rPr lang="hu-HU" smtClean="0"/>
-              <a:t>2022. 04. 26.</a:t>
+              <a:t>2022. 04. 27.</a:t>
             </a:fld>
             <a:endParaRPr lang="hu-HU"/>
           </a:p>
@@ -9957,7 +9957,7 @@
           <a:p>
             <a:fld id="{DD82B1F4-9425-4268-98EC-A420B44983D5}" type="datetimeFigureOut">
               <a:rPr lang="hu-HU" smtClean="0"/>
-              <a:t>2022. 04. 26.</a:t>
+              <a:t>2022. 04. 27.</a:t>
             </a:fld>
             <a:endParaRPr lang="hu-HU"/>
           </a:p>
@@ -10373,7 +10373,7 @@
           <a:p>
             <a:fld id="{DD82B1F4-9425-4268-98EC-A420B44983D5}" type="datetimeFigureOut">
               <a:rPr lang="hu-HU" smtClean="0"/>
-              <a:t>2022. 04. 26.</a:t>
+              <a:t>2022. 04. 27.</a:t>
             </a:fld>
             <a:endParaRPr lang="hu-HU"/>
           </a:p>
@@ -10522,7 +10522,7 @@
           <a:p>
             <a:fld id="{DD82B1F4-9425-4268-98EC-A420B44983D5}" type="datetimeFigureOut">
               <a:rPr lang="hu-HU" smtClean="0"/>
-              <a:t>2022. 04. 26.</a:t>
+              <a:t>2022. 04. 27.</a:t>
             </a:fld>
             <a:endParaRPr lang="hu-HU"/>
           </a:p>
@@ -10648,7 +10648,7 @@
           <a:p>
             <a:fld id="{DD82B1F4-9425-4268-98EC-A420B44983D5}" type="datetimeFigureOut">
               <a:rPr lang="hu-HU" smtClean="0"/>
-              <a:t>2022. 04. 26.</a:t>
+              <a:t>2022. 04. 27.</a:t>
             </a:fld>
             <a:endParaRPr lang="hu-HU"/>
           </a:p>
@@ -10899,7 +10899,7 @@
           <a:p>
             <a:fld id="{DD82B1F4-9425-4268-98EC-A420B44983D5}" type="datetimeFigureOut">
               <a:rPr lang="hu-HU" smtClean="0"/>
-              <a:t>2022. 04. 26.</a:t>
+              <a:t>2022. 04. 27.</a:t>
             </a:fld>
             <a:endParaRPr lang="hu-HU"/>
           </a:p>
@@ -11344,7 +11344,7 @@
           <a:p>
             <a:fld id="{DD82B1F4-9425-4268-98EC-A420B44983D5}" type="datetimeFigureOut">
               <a:rPr lang="hu-HU" smtClean="0"/>
-              <a:t>2022. 04. 26.</a:t>
+              <a:t>2022. 04. 27.</a:t>
             </a:fld>
             <a:endParaRPr lang="hu-HU"/>
           </a:p>
@@ -11671,7 +11671,7 @@
           <a:p>
             <a:fld id="{DD82B1F4-9425-4268-98EC-A420B44983D5}" type="datetimeFigureOut">
               <a:rPr lang="hu-HU" smtClean="0"/>
-              <a:t>2022. 04. 26.</a:t>
+              <a:t>2022. 04. 27.</a:t>
             </a:fld>
             <a:endParaRPr lang="hu-HU"/>
           </a:p>
@@ -13058,7 +13058,22 @@
           <a:bodyPr/>
           <a:lstStyle/>
           <a:p>
-            <a:endParaRPr lang="hu-HU" dirty="0"/>
+            <a:r>
+              <a:rPr lang="hu-HU" dirty="0" err="1"/>
+              <a:t>Axios</a:t>
+            </a:r>
+            <a:r>
+              <a:rPr lang="hu-HU" dirty="0"/>
+              <a:t> and </a:t>
+            </a:r>
+            <a:r>
+              <a:rPr lang="hu-HU" dirty="0" err="1"/>
+              <a:t>form</a:t>
+            </a:r>
+            <a:r>
+              <a:rPr lang="hu-HU" dirty="0"/>
+              <a:t> testing.</a:t>
+            </a:r>
           </a:p>
         </p:txBody>
       </p:sp>
@@ -13617,6 +13632,22 @@
               <a:rPr lang="hu-HU" dirty="0" err="1"/>
               <a:t>Bootstrap</a:t>
             </a:r>
+            <a:r>
+              <a:rPr lang="hu-HU" dirty="0"/>
+              <a:t>, </a:t>
+            </a:r>
+            <a:r>
+              <a:rPr lang="hu-HU" dirty="0" err="1"/>
+              <a:t>useIsAdmin</a:t>
+            </a:r>
+            <a:r>
+              <a:rPr lang="hu-HU" dirty="0"/>
+              <a:t>, </a:t>
+            </a:r>
+            <a:r>
+              <a:rPr lang="hu-HU" dirty="0" err="1"/>
+              <a:t>useIsLoggedIn</a:t>
+            </a:r>
             <a:endParaRPr lang="hu-HU" dirty="0"/>
           </a:p>
           <a:p>
@@ -13766,40 +13797,51 @@
             </a:r>
             <a:r>
               <a:rPr lang="hu-HU" dirty="0"/>
+              <a:t> and </a:t>
+            </a:r>
+            <a:r>
+              <a:rPr lang="hu-HU" dirty="0" err="1"/>
+              <a:t>form</a:t>
+            </a:r>
+            <a:r>
+              <a:rPr lang="hu-HU" dirty="0"/>
               <a:t> </a:t>
             </a:r>
             <a:r>
               <a:rPr lang="hu-HU" dirty="0" err="1"/>
               <a:t>tests</a:t>
+            </a:r>
+            <a:r>
+              <a:rPr lang="hu-HU" dirty="0"/>
+              <a:t>,</a:t>
+            </a:r>
+          </a:p>
+          <a:p>
+            <a:r>
+              <a:rPr lang="hu-HU" dirty="0" err="1"/>
+              <a:t>Style</a:t>
+            </a:r>
+            <a:r>
+              <a:rPr lang="hu-HU" dirty="0"/>
+              <a:t>: CSS </a:t>
+            </a:r>
+            <a:r>
+              <a:rPr lang="hu-HU" dirty="0" err="1"/>
+              <a:t>files</a:t>
+            </a:r>
+            <a:r>
+              <a:rPr lang="hu-HU" dirty="0"/>
+              <a:t>, </a:t>
+            </a:r>
+            <a:r>
+              <a:rPr lang="hu-HU" dirty="0" err="1"/>
+              <a:t>Bootstrap</a:t>
             </a:r>
             <a:endParaRPr lang="hu-HU" dirty="0"/>
           </a:p>
           <a:p>
             <a:r>
               <a:rPr lang="hu-HU" dirty="0" err="1"/>
-              <a:t>Style</a:t>
-            </a:r>
-            <a:r>
-              <a:rPr lang="hu-HU" dirty="0"/>
-              <a:t>: CSS </a:t>
-            </a:r>
-            <a:r>
-              <a:rPr lang="hu-HU" dirty="0" err="1"/>
-              <a:t>files</a:t>
-            </a:r>
-            <a:r>
-              <a:rPr lang="hu-HU" dirty="0"/>
-              <a:t>, </a:t>
-            </a:r>
-            <a:r>
-              <a:rPr lang="hu-HU" dirty="0" err="1"/>
-              <a:t>Bootstrap</a:t>
-            </a:r>
-            <a:endParaRPr lang="hu-HU" dirty="0"/>
-          </a:p>
-          <a:p>
-            <a:r>
-              <a:rPr lang="hu-HU" dirty="0" err="1"/>
               <a:t>Database</a:t>
             </a:r>
             <a:r>
@@ -13832,7 +13874,7 @@
             </a:r>
             <a:r>
               <a:rPr lang="hu-HU" dirty="0" err="1"/>
-              <a:t>PHPMyAdmin</a:t>
+              <a:t>phpMyAdmin</a:t>
             </a:r>
             <a:endParaRPr lang="hu-HU" dirty="0"/>
           </a:p>
@@ -15181,7 +15223,7 @@
         </p:spPr>
         <p:txBody>
           <a:bodyPr>
-            <a:normAutofit fontScale="85000" lnSpcReduction="10000"/>
+            <a:normAutofit fontScale="77500" lnSpcReduction="20000"/>
           </a:bodyPr>
           <a:lstStyle/>
           <a:p>
@@ -15194,12 +15236,8 @@
               <a:t>Node</a:t>
             </a:r>
             <a:r>
-              <a:rPr lang="hu-HU" sz="2800"/>
-              <a:t> 16.13.1.</a:t>
-            </a:r>
-            <a:r>
               <a:rPr lang="hu-HU" sz="2800" dirty="0"/>
-              <a:t>v.</a:t>
+              <a:t> 16.13.1.v.</a:t>
             </a:r>
           </a:p>
           <a:p>
@@ -15311,6 +15349,17 @@
             <a:r>
               <a:rPr lang="hu-HU" sz="2800" dirty="0" err="1"/>
               <a:t>Bcrypt</a:t>
+            </a:r>
+            <a:endParaRPr lang="hu-HU" sz="2800" dirty="0"/>
+          </a:p>
+          <a:p>
+            <a:pPr marL="285750" indent="-285750">
+              <a:buFont typeface="Arial" panose="020B0604020202020204" pitchFamily="34" charset="0"/>
+              <a:buChar char="•"/>
+            </a:pPr>
+            <a:r>
+              <a:rPr lang="hu-HU" sz="2800" dirty="0" err="1"/>
+              <a:t>Authentication</a:t>
             </a:r>
             <a:endParaRPr lang="hu-HU" dirty="0"/>
           </a:p>
@@ -15581,7 +15630,7 @@
         </p:spPr>
         <p:txBody>
           <a:bodyPr vert="horz" lIns="91440" tIns="45720" rIns="91440" bIns="45720" rtlCol="0" anchor="t">
-            <a:normAutofit lnSpcReduction="10000"/>
+            <a:normAutofit/>
           </a:bodyPr>
           <a:lstStyle/>
           <a:p>
@@ -15644,8 +15693,12 @@
               <a:buChar char="•"/>
             </a:pPr>
             <a:r>
-              <a:rPr lang="en-US" sz="2800" dirty="0"/>
-              <a:t>Authentication (roles)</a:t>
+              <a:rPr lang="hu-HU" sz="2800" dirty="0"/>
+              <a:t>R</a:t>
+            </a:r>
+            <a:r>
+              <a:rPr lang="en-US" sz="2800" dirty="0" err="1"/>
+              <a:t>oles</a:t>
             </a:r>
             <a:endParaRPr lang="en-US" dirty="0"/>
           </a:p>
@@ -15782,7 +15835,7 @@
             <p:ph idx="1"/>
             <p:extLst>
               <p:ext uri="{D42A27DB-BD31-4B8C-83A1-F6EECF244321}">
-                <p14:modId xmlns:p14="http://schemas.microsoft.com/office/powerpoint/2010/main" val="421051811"/>
+                <p14:modId xmlns:p14="http://schemas.microsoft.com/office/powerpoint/2010/main" val="3467870212"/>
               </p:ext>
             </p:extLst>
           </p:nvPr>

</xml_diff>